<commit_message>
adding presentation to README
</commit_message>
<xml_diff>
--- a/FACIA-Presentation.pptx
+++ b/FACIA-Presentation.pptx
@@ -203,7 +203,7 @@
           <a:p>
             <a:fld id="{5960E34B-F5C8-1548-B202-64A8C05AD27A}" type="datetimeFigureOut">
               <a:rPr lang="en-US" smtClean="0"/>
-              <a:t>5/12/2020</a:t>
+              <a:t>5/15/20</a:t>
             </a:fld>
             <a:endParaRPr lang="en-US"/>
           </a:p>
@@ -1205,7 +1205,7 @@
           <a:p>
             <a:fld id="{7270E19F-C401-C048-81A2-7C1C6E873FB6}" type="datetimeFigureOut">
               <a:rPr lang="en-US" smtClean="0"/>
-              <a:t>5/12/2020</a:t>
+              <a:t>5/15/20</a:t>
             </a:fld>
             <a:endParaRPr lang="en-US"/>
           </a:p>
@@ -1403,7 +1403,7 @@
           <a:p>
             <a:fld id="{7270E19F-C401-C048-81A2-7C1C6E873FB6}" type="datetimeFigureOut">
               <a:rPr lang="en-US" smtClean="0"/>
-              <a:t>5/12/2020</a:t>
+              <a:t>5/15/20</a:t>
             </a:fld>
             <a:endParaRPr lang="en-US"/>
           </a:p>
@@ -1611,7 +1611,7 @@
           <a:p>
             <a:fld id="{7270E19F-C401-C048-81A2-7C1C6E873FB6}" type="datetimeFigureOut">
               <a:rPr lang="en-US" smtClean="0"/>
-              <a:t>5/12/2020</a:t>
+              <a:t>5/15/20</a:t>
             </a:fld>
             <a:endParaRPr lang="en-US"/>
           </a:p>
@@ -1809,7 +1809,7 @@
           <a:p>
             <a:fld id="{7270E19F-C401-C048-81A2-7C1C6E873FB6}" type="datetimeFigureOut">
               <a:rPr lang="en-US" smtClean="0"/>
-              <a:t>5/12/2020</a:t>
+              <a:t>5/15/20</a:t>
             </a:fld>
             <a:endParaRPr lang="en-US"/>
           </a:p>
@@ -2084,7 +2084,7 @@
           <a:p>
             <a:fld id="{7270E19F-C401-C048-81A2-7C1C6E873FB6}" type="datetimeFigureOut">
               <a:rPr lang="en-US" smtClean="0"/>
-              <a:t>5/12/2020</a:t>
+              <a:t>5/15/20</a:t>
             </a:fld>
             <a:endParaRPr lang="en-US"/>
           </a:p>
@@ -2349,7 +2349,7 @@
           <a:p>
             <a:fld id="{7270E19F-C401-C048-81A2-7C1C6E873FB6}" type="datetimeFigureOut">
               <a:rPr lang="en-US" smtClean="0"/>
-              <a:t>5/12/2020</a:t>
+              <a:t>5/15/20</a:t>
             </a:fld>
             <a:endParaRPr lang="en-US"/>
           </a:p>
@@ -2761,7 +2761,7 @@
           <a:p>
             <a:fld id="{7270E19F-C401-C048-81A2-7C1C6E873FB6}" type="datetimeFigureOut">
               <a:rPr lang="en-US" smtClean="0"/>
-              <a:t>5/12/2020</a:t>
+              <a:t>5/15/20</a:t>
             </a:fld>
             <a:endParaRPr lang="en-US"/>
           </a:p>
@@ -2902,7 +2902,7 @@
           <a:p>
             <a:fld id="{7270E19F-C401-C048-81A2-7C1C6E873FB6}" type="datetimeFigureOut">
               <a:rPr lang="en-US" smtClean="0"/>
-              <a:t>5/12/2020</a:t>
+              <a:t>5/15/20</a:t>
             </a:fld>
             <a:endParaRPr lang="en-US"/>
           </a:p>
@@ -3015,7 +3015,7 @@
           <a:p>
             <a:fld id="{7270E19F-C401-C048-81A2-7C1C6E873FB6}" type="datetimeFigureOut">
               <a:rPr lang="en-US" smtClean="0"/>
-              <a:t>5/12/2020</a:t>
+              <a:t>5/15/20</a:t>
             </a:fld>
             <a:endParaRPr lang="en-US"/>
           </a:p>
@@ -3326,7 +3326,7 @@
           <a:p>
             <a:fld id="{7270E19F-C401-C048-81A2-7C1C6E873FB6}" type="datetimeFigureOut">
               <a:rPr lang="en-US" smtClean="0"/>
-              <a:t>5/12/2020</a:t>
+              <a:t>5/15/20</a:t>
             </a:fld>
             <a:endParaRPr lang="en-US"/>
           </a:p>
@@ -3614,7 +3614,7 @@
           <a:p>
             <a:fld id="{7270E19F-C401-C048-81A2-7C1C6E873FB6}" type="datetimeFigureOut">
               <a:rPr lang="en-US" smtClean="0"/>
-              <a:t>5/12/2020</a:t>
+              <a:t>5/15/20</a:t>
             </a:fld>
             <a:endParaRPr lang="en-US"/>
           </a:p>
@@ -3858,7 +3858,7 @@
           <a:p>
             <a:fld id="{7270E19F-C401-C048-81A2-7C1C6E873FB6}" type="datetimeFigureOut">
               <a:rPr lang="en-US" smtClean="0"/>
-              <a:t>5/12/2020</a:t>
+              <a:t>5/15/20</a:t>
             </a:fld>
             <a:endParaRPr lang="en-US"/>
           </a:p>
@@ -4360,7 +4360,7 @@
         </p:spPr>
         <p:txBody>
           <a:bodyPr vert="horz" lIns="91440" tIns="45720" rIns="91440" bIns="45720" rtlCol="0">
-            <a:normAutofit/>
+            <a:normAutofit lnSpcReduction="10000"/>
           </a:bodyPr>
           <a:lstStyle>
             <a:lvl1pPr marL="0" indent="0" algn="ctr" defTabSz="914400" rtl="0" eaLnBrk="1" latinLnBrk="0" hangingPunct="1">
@@ -4929,7 +4929,7 @@
         </p:spPr>
         <p:txBody>
           <a:bodyPr>
-            <a:normAutofit lnSpcReduction="10000"/>
+            <a:normAutofit fontScale="92500" lnSpcReduction="10000"/>
           </a:bodyPr>
           <a:lstStyle/>
           <a:p>
@@ -4937,22 +4937,22 @@
               <a:buNone/>
             </a:pPr>
             <a:r>
-              <a:rPr lang="en-US" sz="2400" dirty="0">
+              <a:rPr lang="en-US" sz="2600" dirty="0">
                 <a:solidFill>
                   <a:schemeClr val="bg1"/>
                 </a:solidFill>
                 <a:latin typeface="Helvetica" pitchFamily="2" charset="0"/>
               </a:rPr>
-              <a:t>FACIA™ is an app that is an all in one financial aid. It can have various features such as: An expense tracker that can dynamically analyze future expense needs and costs. Some sub-features would include a tip calculator, a tax calculator, and more.</a:t>
+              <a:t>FACIA™ is all-in-one financial aid app.  It provides a personal budgeting snapshot into one’s expenses and features handy calculators and a currency converter.</a:t>
             </a:r>
           </a:p>
           <a:p>
             <a:pPr marL="0" indent="0">
               <a:buNone/>
             </a:pPr>
-            <a:endParaRPr lang="en-US" sz="2400" dirty="0">
+            <a:endParaRPr lang="en-US" sz="2400" b="1" dirty="0">
               <a:solidFill>
-                <a:schemeClr val="bg1"/>
+                <a:srgbClr val="C3AB49"/>
               </a:solidFill>
               <a:latin typeface="Helvetica" pitchFamily="2" charset="0"/>
             </a:endParaRPr>
@@ -5040,7 +5040,18 @@
                 </a:solidFill>
                 <a:latin typeface="Helvetica" pitchFamily="2" charset="0"/>
               </a:rPr>
-              <a:t>Stocks</a:t>
+              <a:t>Currency Converter</a:t>
+            </a:r>
+          </a:p>
+          <a:p>
+            <a:r>
+              <a:rPr lang="en-US" sz="2400" dirty="0">
+                <a:solidFill>
+                  <a:schemeClr val="bg1"/>
+                </a:solidFill>
+                <a:latin typeface="Helvetica" pitchFamily="2" charset="0"/>
+              </a:rPr>
+              <a:t>Financial News Results</a:t>
             </a:r>
           </a:p>
         </p:txBody>
@@ -5275,7 +5286,7 @@
         </p:spPr>
         <p:txBody>
           <a:bodyPr>
-            <a:normAutofit/>
+            <a:normAutofit lnSpcReduction="10000"/>
           </a:bodyPr>
           <a:lstStyle/>
           <a:p>
@@ -5297,7 +5308,7 @@
               <a:buNone/>
             </a:pPr>
             <a:r>
-              <a:rPr lang="en-US" sz="2400" dirty="0">
+              <a:rPr lang="en-US" sz="2400" b="1" dirty="0">
                 <a:solidFill>
                   <a:schemeClr val="bg1"/>
                 </a:solidFill>
@@ -5340,6 +5351,30 @@
                 <a:latin typeface="Helvetica" pitchFamily="2" charset="0"/>
               </a:rPr>
               <a:t>General design</a:t>
+            </a:r>
+          </a:p>
+          <a:p>
+            <a:pPr lvl="1"/>
+            <a:r>
+              <a:rPr lang="en-US" sz="2000" dirty="0">
+                <a:solidFill>
+                  <a:schemeClr val="bg1"/>
+                </a:solidFill>
+                <a:latin typeface="Helvetica" pitchFamily="2" charset="0"/>
+              </a:rPr>
+              <a:t>Currency Converter</a:t>
+            </a:r>
+          </a:p>
+          <a:p>
+            <a:pPr lvl="1"/>
+            <a:r>
+              <a:rPr lang="en-US" sz="2000" dirty="0">
+                <a:solidFill>
+                  <a:schemeClr val="bg1"/>
+                </a:solidFill>
+                <a:latin typeface="Helvetica" pitchFamily="2" charset="0"/>
+              </a:rPr>
+              <a:t>Presentation</a:t>
             </a:r>
           </a:p>
           <a:p>
@@ -5372,7 +5407,7 @@
               <a:buNone/>
             </a:pPr>
             <a:r>
-              <a:rPr lang="en-US" sz="2400" dirty="0">
+              <a:rPr lang="en-US" sz="2400" b="1" dirty="0">
                 <a:solidFill>
                   <a:schemeClr val="bg1"/>
                 </a:solidFill>
@@ -5638,7 +5673,7 @@
         </p:spPr>
         <p:txBody>
           <a:bodyPr vert="horz" lIns="91440" tIns="45720" rIns="91440" bIns="45720" rtlCol="0">
-            <a:normAutofit fontScale="92500" lnSpcReduction="10000"/>
+            <a:normAutofit/>
           </a:bodyPr>
           <a:lstStyle>
             <a:lvl1pPr marL="228600" indent="-228600" algn="l" defTabSz="914400" rtl="0" eaLnBrk="1" latinLnBrk="0" hangingPunct="1">
@@ -5828,7 +5863,7 @@
           <a:p>
             <a:pPr fontAlgn="base"/>
             <a:r>
-              <a:rPr lang="en-US" sz="2400" dirty="0">
+              <a:rPr lang="en-US" sz="2200" dirty="0">
                 <a:solidFill>
                   <a:schemeClr val="bg1"/>
                 </a:solidFill>
@@ -5840,7 +5875,7 @@
           <a:p>
             <a:pPr fontAlgn="base"/>
             <a:r>
-              <a:rPr lang="en-US" sz="2400" dirty="0">
+              <a:rPr lang="en-US" sz="2200" dirty="0">
                 <a:solidFill>
                   <a:schemeClr val="bg1"/>
                 </a:solidFill>
@@ -5849,7 +5884,7 @@
               <a:t>MySQL Database with a </a:t>
             </a:r>
             <a:r>
-              <a:rPr lang="en-US" sz="2400" dirty="0" err="1">
+              <a:rPr lang="en-US" sz="2200" dirty="0" err="1">
                 <a:solidFill>
                   <a:schemeClr val="bg1"/>
                 </a:solidFill>
@@ -5858,7 +5893,7 @@
               <a:t>Sequelize</a:t>
             </a:r>
             <a:r>
-              <a:rPr lang="en-US" sz="2400" dirty="0">
+              <a:rPr lang="en-US" sz="2200" dirty="0">
                 <a:solidFill>
                   <a:schemeClr val="bg1"/>
                 </a:solidFill>
@@ -5870,7 +5905,7 @@
           <a:p>
             <a:pPr fontAlgn="base"/>
             <a:r>
-              <a:rPr lang="en-US" sz="2400" dirty="0">
+              <a:rPr lang="en-US" sz="2200" dirty="0">
                 <a:solidFill>
                   <a:schemeClr val="bg1"/>
                 </a:solidFill>
@@ -5882,36 +5917,24 @@
           <a:p>
             <a:pPr fontAlgn="base"/>
             <a:r>
-              <a:rPr lang="en-US" sz="2400" dirty="0">
+              <a:rPr lang="en-US" sz="2200" dirty="0">
                 <a:solidFill>
                   <a:schemeClr val="bg1"/>
                 </a:solidFill>
                 <a:latin typeface="Helvetica" pitchFamily="2" charset="0"/>
               </a:rPr>
-              <a:t>Heroku (with data, for deployment)</a:t>
-            </a:r>
-          </a:p>
-          <a:p>
-            <a:pPr fontAlgn="base"/>
-            <a:r>
-              <a:rPr lang="en-US" sz="2400" dirty="0">
+              <a:t>Heroku (with data, for deployment) and </a:t>
+            </a:r>
+            <a:r>
+              <a:rPr lang="en-US" sz="2200" dirty="0" err="1">
                 <a:solidFill>
                   <a:schemeClr val="bg1"/>
                 </a:solidFill>
                 <a:latin typeface="Helvetica" pitchFamily="2" charset="0"/>
               </a:rPr>
-              <a:t>Travis CI and </a:t>
-            </a:r>
-            <a:r>
-              <a:rPr lang="en-US" sz="2400" dirty="0" err="1">
-                <a:solidFill>
-                  <a:schemeClr val="bg1"/>
-                </a:solidFill>
-                <a:latin typeface="Helvetica" pitchFamily="2" charset="0"/>
-              </a:rPr>
-              <a:t>ESLint</a:t>
-            </a:r>
-            <a:endParaRPr lang="en-US" sz="2400" dirty="0">
+              <a:t>JAWSdb</a:t>
+            </a:r>
+            <a:endParaRPr lang="en-US" sz="2200" dirty="0">
               <a:solidFill>
                 <a:schemeClr val="bg1"/>
               </a:solidFill>
@@ -5921,62 +5944,43 @@
           <a:p>
             <a:pPr fontAlgn="base"/>
             <a:r>
-              <a:rPr lang="en-US" sz="2400" dirty="0">
+              <a:rPr lang="en-US" sz="2200" dirty="0">
                 <a:solidFill>
                   <a:schemeClr val="bg1"/>
                 </a:solidFill>
-                <a:highlight>
-                  <a:srgbClr val="C3AB49"/>
-                </a:highlight>
                 <a:latin typeface="Helvetica" pitchFamily="2" charset="0"/>
               </a:rPr>
-              <a:t>Incorporates at least one new library, package, or technology that we haven’t discussed (currency converter </a:t>
-            </a:r>
-            <a:r>
-              <a:rPr lang="en-US" sz="2400" dirty="0" err="1">
+              <a:t>Travis CI and </a:t>
+            </a:r>
+            <a:r>
+              <a:rPr lang="en-US" sz="2200" dirty="0" err="1">
                 <a:solidFill>
                   <a:schemeClr val="bg1"/>
                 </a:solidFill>
-                <a:highlight>
-                  <a:srgbClr val="C3AB49"/>
-                </a:highlight>
                 <a:latin typeface="Helvetica" pitchFamily="2" charset="0"/>
               </a:rPr>
-              <a:t>npm</a:t>
-            </a:r>
-            <a:r>
-              <a:rPr lang="en-US" sz="2400" dirty="0">
+              <a:t>ESLint</a:t>
+            </a:r>
+            <a:endParaRPr lang="en-US" sz="2200" dirty="0">
+              <a:solidFill>
+                <a:schemeClr val="bg1"/>
+              </a:solidFill>
+              <a:latin typeface="Helvetica" pitchFamily="2" charset="0"/>
+            </a:endParaRPr>
+          </a:p>
+          <a:p>
+            <a:pPr fontAlgn="base"/>
+            <a:r>
+              <a:rPr lang="en-US" sz="2200" dirty="0">
                 <a:solidFill>
                   <a:schemeClr val="bg1"/>
                 </a:solidFill>
-                <a:highlight>
-                  <a:srgbClr val="C3AB49"/>
-                </a:highlight>
                 <a:latin typeface="Helvetica" pitchFamily="2" charset="0"/>
               </a:rPr>
-              <a:t> package)</a:t>
-            </a:r>
-          </a:p>
-          <a:p>
-            <a:pPr fontAlgn="base"/>
-            <a:r>
-              <a:rPr lang="en-US" sz="2400" dirty="0">
-                <a:solidFill>
-                  <a:schemeClr val="bg1"/>
-                </a:solidFill>
-                <a:latin typeface="Helvetica" pitchFamily="2" charset="0"/>
-              </a:rPr>
-              <a:t>Polygon Stock API</a:t>
-            </a:r>
-          </a:p>
-          <a:p>
-            <a:pPr marL="685800" lvl="2" fontAlgn="base">
-              <a:spcBef>
-                <a:spcPts val="1000"/>
-              </a:spcBef>
-            </a:pPr>
-            <a:r>
-              <a:rPr lang="en-US" dirty="0">
+              <a:t>A currency converter widget from </a:t>
+            </a:r>
+            <a:r>
+              <a:rPr lang="en-US" sz="2200" dirty="0">
                 <a:solidFill>
                   <a:schemeClr val="bg1"/>
                 </a:solidFill>
@@ -5989,9 +5993,46 @@
                   </a:extLst>
                 </a:hlinkClick>
               </a:rPr>
+              <a:t>https://currencyrate.today</a:t>
+            </a:r>
+            <a:r>
+              <a:rPr lang="en-US" sz="2200" dirty="0">
+                <a:solidFill>
+                  <a:schemeClr val="bg1"/>
+                </a:solidFill>
+                <a:latin typeface="Helvetica" pitchFamily="2" charset="0"/>
+              </a:rPr>
+              <a:t>	</a:t>
+            </a:r>
+          </a:p>
+          <a:p>
+            <a:pPr fontAlgn="base"/>
+            <a:r>
+              <a:rPr lang="en-US" sz="2200" dirty="0">
+                <a:solidFill>
+                  <a:schemeClr val="bg1"/>
+                </a:solidFill>
+                <a:latin typeface="Helvetica" pitchFamily="2" charset="0"/>
+              </a:rPr>
+              <a:t>Polygon Stock API from </a:t>
+            </a:r>
+            <a:r>
+              <a:rPr lang="en-US" sz="2200" dirty="0">
+                <a:solidFill>
+                  <a:schemeClr val="bg1"/>
+                </a:solidFill>
+                <a:latin typeface="Helvetica" pitchFamily="2" charset="0"/>
+                <a:hlinkClick r:id="rId4">
+                  <a:extLst>
+                    <a:ext uri="{A12FA001-AC4F-418D-AE19-62706E023703}">
+                      <ahyp:hlinkClr xmlns:ahyp="http://schemas.microsoft.com/office/drawing/2018/hyperlinkcolor" val="tx"/>
+                    </a:ext>
+                  </a:extLst>
+                </a:hlinkClick>
+              </a:rPr>
               <a:t>https://polygon.io/</a:t>
             </a:r>
-            <a:endParaRPr lang="en-US" dirty="0">
+            <a:endParaRPr lang="en-US" sz="2200" dirty="0">
               <a:solidFill>
                 <a:schemeClr val="bg1"/>
               </a:solidFill>
@@ -6001,22 +6042,7 @@
           <a:p>
             <a:pPr fontAlgn="base"/>
             <a:r>
-              <a:rPr lang="en-US" sz="2400" dirty="0">
-                <a:solidFill>
-                  <a:schemeClr val="bg1"/>
-                </a:solidFill>
-                <a:highlight>
-                  <a:srgbClr val="C3AB49"/>
-                </a:highlight>
-                <a:latin typeface="Helvetica" pitchFamily="2" charset="0"/>
-              </a:rPr>
-              <a:t>--- Tax API</a:t>
-            </a:r>
-          </a:p>
-          <a:p>
-            <a:pPr fontAlgn="base"/>
-            <a:r>
-              <a:rPr lang="en-US" sz="2400" dirty="0">
+              <a:rPr lang="en-US" sz="2200" dirty="0">
                 <a:solidFill>
                   <a:schemeClr val="bg1"/>
                 </a:solidFill>
@@ -6188,7 +6214,7 @@
           <p:nvPr/>
         </p:nvPicPr>
         <p:blipFill>
-          <a:blip r:embed="rId4"/>
+          <a:blip r:embed="rId5"/>
           <a:stretch>
             <a:fillRect/>
           </a:stretch>
@@ -6411,10 +6437,11 @@
       </p:pic>
       <p:pic>
         <p:nvPicPr>
-          <p:cNvPr id="3" name="Picture 2">
-            <a:extLst>
-              <a:ext uri="{FF2B5EF4-FFF2-40B4-BE49-F238E27FC236}">
-                <a16:creationId xmlns:a16="http://schemas.microsoft.com/office/drawing/2014/main" id="{B11DA9A9-A44C-2F4A-A339-3AABBE0E94F3}"/>
+          <p:cNvPr id="4" name="Picture 3">
+            <a:hlinkClick r:id="rId4"/>
+            <a:extLst>
+              <a:ext uri="{FF2B5EF4-FFF2-40B4-BE49-F238E27FC236}">
+                <a16:creationId xmlns:a16="http://schemas.microsoft.com/office/drawing/2014/main" id="{71C1FF67-052F-6F4F-908D-7C1931160F40}"/>
               </a:ext>
             </a:extLst>
           </p:cNvPr>
@@ -6424,15 +6451,15 @@
           <p:nvPr/>
         </p:nvPicPr>
         <p:blipFill>
-          <a:blip r:embed="rId4"/>
+          <a:blip r:embed="rId5"/>
           <a:stretch>
             <a:fillRect/>
           </a:stretch>
         </p:blipFill>
         <p:spPr>
           <a:xfrm>
-            <a:off x="3067002" y="1220074"/>
-            <a:ext cx="6035962" cy="4840377"/>
+            <a:off x="5211535" y="5968386"/>
+            <a:ext cx="1768929" cy="495300"/>
           </a:xfrm>
           <a:prstGeom prst="rect">
             <a:avLst/>
@@ -6441,11 +6468,10 @@
       </p:pic>
       <p:pic>
         <p:nvPicPr>
-          <p:cNvPr id="4" name="Picture 3">
-            <a:hlinkClick r:id="rId5"/>
-            <a:extLst>
-              <a:ext uri="{FF2B5EF4-FFF2-40B4-BE49-F238E27FC236}">
-                <a16:creationId xmlns:a16="http://schemas.microsoft.com/office/drawing/2014/main" id="{71C1FF67-052F-6F4F-908D-7C1931160F40}"/>
+          <p:cNvPr id="10" name="Picture 9">
+            <a:extLst>
+              <a:ext uri="{FF2B5EF4-FFF2-40B4-BE49-F238E27FC236}">
+                <a16:creationId xmlns:a16="http://schemas.microsoft.com/office/drawing/2014/main" id="{6EC6F31B-6C77-F640-AAC3-F5BE870B4B60}"/>
               </a:ext>
             </a:extLst>
           </p:cNvPr>
@@ -6462,8 +6488,8 @@
         </p:blipFill>
         <p:spPr>
           <a:xfrm>
-            <a:off x="5211535" y="5968386"/>
-            <a:ext cx="1768929" cy="495300"/>
+            <a:off x="2712657" y="1242513"/>
+            <a:ext cx="6766683" cy="4852181"/>
           </a:xfrm>
           <a:prstGeom prst="rect">
             <a:avLst/>
@@ -6530,11 +6556,14 @@
           <a:p>
             <a:pPr fontAlgn="base">
               <a:lnSpc>
-                <a:spcPct val="150000"/>
+                <a:spcPct val="100000"/>
               </a:lnSpc>
+              <a:spcAft>
+                <a:spcPts val="1200"/>
+              </a:spcAft>
             </a:pPr>
             <a:r>
-              <a:rPr lang="en-US" sz="2000" dirty="0">
+              <a:rPr lang="en-US" sz="2200" dirty="0">
                 <a:solidFill>
                   <a:schemeClr val="bg1"/>
                 </a:solidFill>
@@ -6546,11 +6575,14 @@
           <a:p>
             <a:pPr fontAlgn="base">
               <a:lnSpc>
-                <a:spcPct val="150000"/>
+                <a:spcPct val="100000"/>
               </a:lnSpc>
+              <a:spcAft>
+                <a:spcPts val="1200"/>
+              </a:spcAft>
             </a:pPr>
             <a:r>
-              <a:rPr lang="en-US" sz="2000" dirty="0">
+              <a:rPr lang="en-US" sz="2200" dirty="0">
                 <a:solidFill>
                   <a:schemeClr val="bg1"/>
                 </a:solidFill>
@@ -6562,11 +6594,14 @@
           <a:p>
             <a:pPr fontAlgn="base">
               <a:lnSpc>
-                <a:spcPct val="150000"/>
+                <a:spcPct val="100000"/>
               </a:lnSpc>
+              <a:spcAft>
+                <a:spcPts val="1200"/>
+              </a:spcAft>
             </a:pPr>
             <a:r>
-              <a:rPr lang="en-US" sz="2000" dirty="0">
+              <a:rPr lang="en-US" sz="2200" dirty="0">
                 <a:solidFill>
                   <a:schemeClr val="bg1"/>
                 </a:solidFill>
@@ -6578,11 +6613,14 @@
           <a:p>
             <a:pPr fontAlgn="base">
               <a:lnSpc>
-                <a:spcPct val="150000"/>
+                <a:spcPct val="100000"/>
               </a:lnSpc>
+              <a:spcAft>
+                <a:spcPts val="1200"/>
+              </a:spcAft>
             </a:pPr>
             <a:r>
-              <a:rPr lang="en-US" sz="2000" dirty="0">
+              <a:rPr lang="en-US" sz="2200" dirty="0">
                 <a:solidFill>
                   <a:schemeClr val="bg1"/>
                 </a:solidFill>
@@ -6594,11 +6632,14 @@
           <a:p>
             <a:pPr fontAlgn="base">
               <a:lnSpc>
-                <a:spcPct val="150000"/>
+                <a:spcPct val="100000"/>
               </a:lnSpc>
+              <a:spcAft>
+                <a:spcPts val="1200"/>
+              </a:spcAft>
             </a:pPr>
             <a:r>
-              <a:rPr lang="en-US" sz="2000" dirty="0">
+              <a:rPr lang="en-US" sz="2200" dirty="0">
                 <a:solidFill>
                   <a:schemeClr val="bg1"/>
                 </a:solidFill>
@@ -6607,14 +6648,14 @@
               <a:t>The process of pushing/pulling to GitHub in a collaboration</a:t>
             </a:r>
             <a:br>
-              <a:rPr lang="en-US" sz="2000" dirty="0">
+              <a:rPr lang="en-US" sz="2200" dirty="0">
                 <a:solidFill>
                   <a:schemeClr val="bg1"/>
                 </a:solidFill>
                 <a:latin typeface="Helvetica" pitchFamily="2" charset="0"/>
               </a:rPr>
             </a:br>
-            <a:endParaRPr lang="en-US" sz="2400" dirty="0">
+            <a:endParaRPr lang="en-US" sz="2200" dirty="0">
               <a:solidFill>
                 <a:schemeClr val="bg1"/>
               </a:solidFill>
@@ -6861,29 +6902,13 @@
               <a:buNone/>
             </a:pPr>
             <a:r>
-              <a:rPr lang="en-US" b="1" dirty="0">
+              <a:rPr lang="en-US" sz="3400" b="1" dirty="0">
                 <a:solidFill>
                   <a:srgbClr val="C3AB49"/>
                 </a:solidFill>
                 <a:latin typeface="Helvetica" pitchFamily="2" charset="0"/>
               </a:rPr>
               <a:t>Additional Features to Add</a:t>
-            </a:r>
-          </a:p>
-          <a:p>
-            <a:pPr fontAlgn="base">
-              <a:lnSpc>
-                <a:spcPct val="150000"/>
-              </a:lnSpc>
-            </a:pPr>
-            <a:r>
-              <a:rPr lang="en-US" sz="2000" dirty="0">
-                <a:solidFill>
-                  <a:schemeClr val="bg1"/>
-                </a:solidFill>
-                <a:latin typeface="Helvetica" pitchFamily="2" charset="0"/>
-              </a:rPr>
-              <a:t>Currency Converter</a:t>
             </a:r>
           </a:p>
           <a:p>
@@ -6896,7 +6921,7 @@
               </a:spcBef>
             </a:pPr>
             <a:r>
-              <a:rPr lang="en-US" sz="2000" dirty="0">
+              <a:rPr lang="en-US" sz="3000" dirty="0">
                 <a:solidFill>
                   <a:schemeClr val="bg1"/>
                 </a:solidFill>
@@ -6915,7 +6940,7 @@
               </a:spcBef>
             </a:pPr>
             <a:r>
-              <a:rPr lang="en-US" sz="2000" dirty="0">
+              <a:rPr lang="en-US" sz="3000" dirty="0">
                 <a:solidFill>
                   <a:schemeClr val="bg1"/>
                 </a:solidFill>
@@ -6923,12 +6948,6 @@
               </a:rPr>
               <a:t>Expense Tracker &amp; Graphs</a:t>
             </a:r>
-            <a:endParaRPr lang="en-US" sz="2400" dirty="0">
-              <a:solidFill>
-                <a:schemeClr val="bg1"/>
-              </a:solidFill>
-              <a:latin typeface="Helvetica" pitchFamily="2" charset="0"/>
-            </a:endParaRPr>
           </a:p>
         </p:txBody>
       </p:sp>

</xml_diff>